<commit_message>
A little change done to the presentation, proposal.pdf is now almost final, need to verify with Soon Song Cheok
</commit_message>
<xml_diff>
--- a/CS563-Project/Project Proposal Presentation.pptx
+++ b/CS563-Project/Project Proposal Presentation.pptx
@@ -4283,7 +4283,7 @@
             </a:pPr>
             <a:r>
               <a:rPr lang="en-US" sz="2400" dirty="0"/>
-              <a:t>Some FL Techniques: Spectrum Based FL, Slice-Based FL, Mutation-Based</a:t>
+              <a:t>Some FL Techniques: Spectrum Based FL, Slice-Based FL, Mutation-Based FL</a:t>
             </a:r>
           </a:p>
           <a:p>
@@ -6147,11 +6147,7 @@
             </a:pPr>
             <a:r>
               <a:rPr lang="en-US" sz="2400" dirty="0"/>
-              <a:t>Analyze which categories of faults (based on taxonomy) are most effectively localized, focusing on the traits of faults that successfully identified vs which are not which are </a:t>
-            </a:r>
-            <a:r>
-              <a:rPr lang="en-US" sz="2400"/>
-              <a:t>not identified. </a:t>
+              <a:t>Analyze which categories of faults (based on taxonomy) are most effectively localized, focusing on the traits of faults that successfully identified vs which are not which are not identified. </a:t>
             </a:r>
             <a:br>
               <a:rPr lang="en-US" sz="2400" dirty="0"/>

</xml_diff>

<commit_message>
Made some changes, and fixed according to what Professor asked us to do
</commit_message>
<xml_diff>
--- a/CS563-Project/Project Proposal Presentation.pptx
+++ b/CS563-Project/Project Proposal Presentation.pptx
@@ -6625,7 +6625,7 @@
         <p:spPr>
           <a:xfrm>
             <a:off x="345440" y="1681480"/>
-            <a:ext cx="11607800" cy="3970318"/>
+            <a:ext cx="11607800" cy="4031873"/>
           </a:xfrm>
           <a:prstGeom prst="rect">
             <a:avLst/>
@@ -6643,78 +6643,72 @@
           </a:bodyPr>
           <a:lstStyle/>
           <a:p>
-            <a:pPr marL="342900" indent="-342900">
-              <a:buFont typeface="Arial" panose="020B0604020202020204" pitchFamily="34" charset="0"/>
-              <a:buChar char="•"/>
+            <a:pPr algn="l">
+              <a:buFont typeface="+mj-lt"/>
+              <a:buAutoNum type="arabicPeriod"/>
             </a:pPr>
             <a:r>
-              <a:rPr lang="en-US" sz="2400" dirty="0"/>
-              <a:t>Fault Localization (FL):</a:t>
-            </a:r>
-          </a:p>
-          <a:p>
-            <a:pPr marL="800100" lvl="1" indent="-342900">
-              <a:buFont typeface="Arial" panose="020B0604020202020204" pitchFamily="34" charset="0"/>
-              <a:buChar char="•"/>
+              <a:rPr lang="en-US" sz="2800" b="1" i="0" u="none" strike="noStrike" dirty="0">
+                <a:effectLst/>
+              </a:rPr>
+              <a:t>Test Execution:</a:t>
+            </a:r>
+            <a:r>
+              <a:rPr lang="en-US" sz="2800" b="0" i="0" u="none" strike="noStrike" dirty="0">
+                <a:effectLst/>
+              </a:rPr>
+              <a:t> Apply selected fault localization techniques to REST API faults, recording successes and failures.</a:t>
+            </a:r>
+          </a:p>
+          <a:p>
+            <a:pPr algn="l">
+              <a:buFont typeface="+mj-lt"/>
+              <a:buAutoNum type="arabicPeriod"/>
             </a:pPr>
             <a:r>
-              <a:rPr lang="en-US" sz="2400" dirty="0"/>
-              <a:t>FL is an essential part in software engineering for identifying the locations of faults (or bugs) in the software code.</a:t>
-            </a:r>
-          </a:p>
-          <a:p>
-            <a:pPr marL="800100" lvl="1" indent="-342900">
-              <a:buFont typeface="Arial" panose="020B0604020202020204" pitchFamily="34" charset="0"/>
-              <a:buChar char="•"/>
+              <a:rPr lang="en-US" sz="2800" b="1" i="0" u="none" strike="noStrike" dirty="0">
+                <a:effectLst/>
+              </a:rPr>
+              <a:t>Results Analysis:</a:t>
+            </a:r>
+            <a:r>
+              <a:rPr lang="en-US" sz="2800" b="0" i="0" u="none" strike="noStrike" dirty="0">
+                <a:effectLst/>
+              </a:rPr>
+              <a:t> Compare technique outputs against taxonomy-grounded truth to assess accuracy and </a:t>
+            </a:r>
+            <a:r>
+              <a:rPr lang="en-US" sz="2800" b="0" i="0" u="none" strike="noStrike">
+                <a:effectLst/>
+              </a:rPr>
+              <a:t>effectiveness.</a:t>
+            </a:r>
+            <a:endParaRPr lang="en-US" sz="2800" b="0" i="0" u="none" strike="noStrike" dirty="0">
+              <a:effectLst/>
+            </a:endParaRPr>
+          </a:p>
+          <a:p>
+            <a:pPr algn="l">
+              <a:buFont typeface="+mj-lt"/>
+              <a:buAutoNum type="arabicPeriod"/>
             </a:pPr>
             <a:r>
-              <a:rPr lang="en-US" sz="2400" dirty="0"/>
-              <a:t>Some FL Techniques: Spectrum Based FL, Slice-Based FL, Mutation-Based</a:t>
-            </a:r>
-          </a:p>
-          <a:p>
-            <a:pPr lvl="1"/>
-            <a:endParaRPr lang="en-US" sz="2400" dirty="0"/>
-          </a:p>
-          <a:p>
-            <a:pPr marL="800100" lvl="1" indent="-342900">
-              <a:buFont typeface="Arial" panose="020B0604020202020204" pitchFamily="34" charset="0"/>
-              <a:buChar char="•"/>
-            </a:pPr>
-            <a:r>
-              <a:rPr lang="en-US" sz="2400" dirty="0"/>
-              <a:t>Evaluation of these Techniques: </a:t>
-            </a:r>
-          </a:p>
-          <a:p>
-            <a:pPr marL="1257300" lvl="2" indent="-342900">
-              <a:buFont typeface="Arial" panose="020B0604020202020204" pitchFamily="34" charset="0"/>
-              <a:buChar char="•"/>
-            </a:pPr>
-            <a:r>
-              <a:rPr lang="en-US" sz="2400" dirty="0"/>
-              <a:t>Specific Dataset (REST API applications – using Spring Boot or Jersey)</a:t>
-            </a:r>
-          </a:p>
-          <a:p>
-            <a:pPr marL="1257300" lvl="2" indent="-342900">
-              <a:buFont typeface="Arial" panose="020B0604020202020204" pitchFamily="34" charset="0"/>
-              <a:buChar char="•"/>
-            </a:pPr>
-            <a:r>
-              <a:rPr lang="en-US" sz="2400" dirty="0"/>
-              <a:t>Effectiveness: Precision, Recall, F-Measure, Accuracy </a:t>
-            </a:r>
-          </a:p>
-          <a:p>
-            <a:pPr marL="1257300" lvl="2" indent="-342900">
-              <a:buFont typeface="Arial" panose="020B0604020202020204" pitchFamily="34" charset="0"/>
-              <a:buChar char="•"/>
-            </a:pPr>
-            <a:r>
-              <a:rPr lang="en-US" sz="2400" dirty="0"/>
-              <a:t>Efficiency: Computation Time</a:t>
-            </a:r>
+              <a:rPr lang="en-US" sz="2800" b="1" i="0" u="none" strike="noStrike" dirty="0">
+                <a:effectLst/>
+              </a:rPr>
+              <a:t>Conclusions Drawn:</a:t>
+            </a:r>
+            <a:r>
+              <a:rPr lang="en-US" sz="2800" b="0" i="0" u="none" strike="noStrike" dirty="0">
+                <a:effectLst/>
+              </a:rPr>
+              <a:t> Analyze and report on which fault types are effectively localized and identify technique strengths and limitations.</a:t>
+            </a:r>
+          </a:p>
+          <a:p>
+            <a:br>
+              <a:rPr lang="en-US" sz="2800" dirty="0"/>
+            </a:br>
             <a:br>
               <a:rPr lang="en-US" sz="2400" dirty="0"/>
             </a:br>

</xml_diff>